<commit_message>
Atualização da aula sobre formulários
</commit_message>
<xml_diff>
--- a/Módulo 08 - Formulários/Módulo VIII - Formulários.pptx
+++ b/Módulo 08 - Formulários/Módulo VIII - Formulários.pptx
@@ -175,6 +175,7 @@
 <p1510:revInfo xmlns:a="http://schemas.openxmlformats.org/drawingml/2006/main" xmlns:r="http://schemas.openxmlformats.org/officeDocument/2006/relationships" xmlns:p1510="http://schemas.microsoft.com/office/powerpoint/2015/10/main">
   <p1510:revLst>
     <p1510:client id="{A96C9791-568C-2A0D-EF82-414A3B514621}" v="627" dt="2024-11-28T23:52:01.066"/>
+    <p1510:client id="{B613C77E-D392-32D7-70E5-E039F220970B}" v="18" dt="2024-11-29T23:04:37.108"/>
   </p1510:revLst>
 </p1510:revInfo>
 </file>
@@ -359,7 +360,7 @@
             <a:fld id="{1D8BD707-D9CF-40AE-B4C6-C98DA3205C09}" type="datetimeFigureOut">
               <a:rPr lang="en-US" smtClean="0"/>
               <a:pPr/>
-              <a:t>11/28/2024</a:t>
+              <a:t>11/29/2024</a:t>
             </a:fld>
             <a:endParaRPr lang="en-US"/>
           </a:p>
@@ -524,7 +525,7 @@
             <a:fld id="{1D8BD707-D9CF-40AE-B4C6-C98DA3205C09}" type="datetimeFigureOut">
               <a:rPr lang="en-US" smtClean="0"/>
               <a:pPr/>
-              <a:t>11/28/2024</a:t>
+              <a:t>11/29/2024</a:t>
             </a:fld>
             <a:endParaRPr lang="en-US"/>
           </a:p>
@@ -699,7 +700,7 @@
             <a:fld id="{1D8BD707-D9CF-40AE-B4C6-C98DA3205C09}" type="datetimeFigureOut">
               <a:rPr lang="en-US" smtClean="0"/>
               <a:pPr/>
-              <a:t>11/28/2024</a:t>
+              <a:t>11/29/2024</a:t>
             </a:fld>
             <a:endParaRPr lang="en-US"/>
           </a:p>
@@ -864,7 +865,7 @@
             <a:fld id="{1D8BD707-D9CF-40AE-B4C6-C98DA3205C09}" type="datetimeFigureOut">
               <a:rPr lang="en-US" smtClean="0"/>
               <a:pPr/>
-              <a:t>11/28/2024</a:t>
+              <a:t>11/29/2024</a:t>
             </a:fld>
             <a:endParaRPr lang="en-US"/>
           </a:p>
@@ -1106,7 +1107,7 @@
             <a:fld id="{1D8BD707-D9CF-40AE-B4C6-C98DA3205C09}" type="datetimeFigureOut">
               <a:rPr lang="en-US" smtClean="0"/>
               <a:pPr/>
-              <a:t>11/28/2024</a:t>
+              <a:t>11/29/2024</a:t>
             </a:fld>
             <a:endParaRPr lang="en-US"/>
           </a:p>
@@ -1388,7 +1389,7 @@
             <a:fld id="{1D8BD707-D9CF-40AE-B4C6-C98DA3205C09}" type="datetimeFigureOut">
               <a:rPr lang="en-US" smtClean="0"/>
               <a:pPr/>
-              <a:t>11/28/2024</a:t>
+              <a:t>11/29/2024</a:t>
             </a:fld>
             <a:endParaRPr lang="en-US"/>
           </a:p>
@@ -1804,7 +1805,7 @@
             <a:fld id="{1D8BD707-D9CF-40AE-B4C6-C98DA3205C09}" type="datetimeFigureOut">
               <a:rPr lang="en-US" smtClean="0"/>
               <a:pPr/>
-              <a:t>11/28/2024</a:t>
+              <a:t>11/29/2024</a:t>
             </a:fld>
             <a:endParaRPr lang="en-US"/>
           </a:p>
@@ -1918,7 +1919,7 @@
             <a:fld id="{1D8BD707-D9CF-40AE-B4C6-C98DA3205C09}" type="datetimeFigureOut">
               <a:rPr lang="en-US" smtClean="0"/>
               <a:pPr/>
-              <a:t>11/28/2024</a:t>
+              <a:t>11/29/2024</a:t>
             </a:fld>
             <a:endParaRPr lang="en-US"/>
           </a:p>
@@ -2010,7 +2011,7 @@
             <a:fld id="{1D8BD707-D9CF-40AE-B4C6-C98DA3205C09}" type="datetimeFigureOut">
               <a:rPr lang="en-US" smtClean="0"/>
               <a:pPr/>
-              <a:t>11/28/2024</a:t>
+              <a:t>11/29/2024</a:t>
             </a:fld>
             <a:endParaRPr lang="en-US"/>
           </a:p>
@@ -2282,7 +2283,7 @@
             <a:fld id="{1D8BD707-D9CF-40AE-B4C6-C98DA3205C09}" type="datetimeFigureOut">
               <a:rPr lang="en-US" smtClean="0"/>
               <a:pPr/>
-              <a:t>11/28/2024</a:t>
+              <a:t>11/29/2024</a:t>
             </a:fld>
             <a:endParaRPr lang="en-US"/>
           </a:p>
@@ -2531,7 +2532,7 @@
             <a:fld id="{1D8BD707-D9CF-40AE-B4C6-C98DA3205C09}" type="datetimeFigureOut">
               <a:rPr lang="en-US" smtClean="0"/>
               <a:pPr/>
-              <a:t>11/28/2024</a:t>
+              <a:t>11/29/2024</a:t>
             </a:fld>
             <a:endParaRPr lang="en-US"/>
           </a:p>
@@ -2739,7 +2740,7 @@
             <a:fld id="{1D8BD707-D9CF-40AE-B4C6-C98DA3205C09}" type="datetimeFigureOut">
               <a:rPr lang="en-US" smtClean="0"/>
               <a:pPr/>
-              <a:t>11/28/2024</a:t>
+              <a:t>11/29/2024</a:t>
             </a:fld>
             <a:endParaRPr lang="en-US"/>
           </a:p>
@@ -4707,29 +4708,10 @@
                   <a:srgbClr val="2B4A9D"/>
                 </a:solidFill>
                 <a:latin typeface="Poppins Bold"/>
+                <a:ea typeface="+mn-lt"/>
                 <a:cs typeface="Poppins Bold"/>
               </a:rPr>
-              <a:t>manipulação</a:t>
-            </a:r>
-            <a:r>
-              <a:rPr lang="en-US" sz="5000" spc="313" dirty="0">
-                <a:solidFill>
-                  <a:srgbClr val="2B4A9D"/>
-                </a:solidFill>
-                <a:latin typeface="Poppins Bold"/>
-                <a:cs typeface="Poppins Bold"/>
-              </a:rPr>
-              <a:t> de </a:t>
-            </a:r>
-            <a:r>
-              <a:rPr lang="en-US" sz="5000" spc="313" dirty="0" err="1">
-                <a:solidFill>
-                  <a:srgbClr val="2B4A9D"/>
-                </a:solidFill>
-                <a:latin typeface="Poppins Bold"/>
-                <a:cs typeface="Poppins Bold"/>
-              </a:rPr>
-              <a:t>estados</a:t>
+              <a:t>DataGrids</a:t>
             </a:r>
             <a:r>
               <a:rPr lang="en-US" sz="5000" spc="313" dirty="0">

</xml_diff>